<commit_message>
update on presentation slides
</commit_message>
<xml_diff>
--- a/Police Presentation.pptx
+++ b/Police Presentation.pptx
@@ -904,7 +904,7 @@
   <p:cSld>
     <p:spTree>
       <p:nvGrpSpPr>
-        <p:cNvPr id="77" name="Shape 77"/>
+        <p:cNvPr id="78" name="Shape 78"/>
         <p:cNvGrpSpPr/>
         <p:nvPr/>
       </p:nvGrpSpPr>
@@ -918,7 +918,7 @@
       </p:grpSpPr>
       <p:sp>
         <p:nvSpPr>
-          <p:cNvPr id="78" name="Google Shape;78;g8d280c4c1a_2_0:notes"/>
+          <p:cNvPr id="79" name="Google Shape;79;g8d280c4c1a_2_0:notes"/>
           <p:cNvSpPr/>
           <p:nvPr>
             <p:ph idx="2" type="sldImg"/>
@@ -953,7 +953,7 @@
       </p:sp>
       <p:sp>
         <p:nvSpPr>
-          <p:cNvPr id="79" name="Google Shape;79;g8d280c4c1a_2_0:notes"/>
+          <p:cNvPr id="80" name="Google Shape;80;g8d280c4c1a_2_0:notes"/>
           <p:cNvSpPr txBox="1"/>
           <p:nvPr>
             <p:ph idx="1" type="body"/>
@@ -974,17 +974,61 @@
           </a:bodyPr>
           <a:lstStyle/>
           <a:p>
-            <a:pPr indent="0" lvl="0" marL="0" rtl="0" algn="l">
-              <a:spcBef>
-                <a:spcPts val="0"/>
-              </a:spcBef>
-              <a:spcAft>
-                <a:spcPts val="0"/>
-              </a:spcAft>
-              <a:buNone/>
+            <a:pPr indent="-298450" lvl="0" marL="457200" rtl="0" algn="l">
+              <a:spcBef>
+                <a:spcPts val="0"/>
+              </a:spcBef>
+              <a:spcAft>
+                <a:spcPts val="0"/>
+              </a:spcAft>
+              <a:buSzPts val="1100"/>
+              <a:buChar char="-"/>
             </a:pPr>
             <a:r>
-              <a:t/>
+              <a:rPr lang="en"/>
+              <a:t>Found top allegations were physical force, word, searches(either person or vehicle), there was even </a:t>
+            </a:r>
+            <a:r>
+              <a:rPr lang="en"/>
+              <a:t>consistently</a:t>
+            </a:r>
+            <a:r>
+              <a:rPr lang="en"/>
+              <a:t> allegations that precinct 75 pointed their weapons.</a:t>
+            </a:r>
+            <a:endParaRPr/>
+          </a:p>
+          <a:p>
+            <a:pPr indent="-298450" lvl="0" marL="457200" rtl="0" algn="l">
+              <a:spcBef>
+                <a:spcPts val="0"/>
+              </a:spcBef>
+              <a:spcAft>
+                <a:spcPts val="0"/>
+              </a:spcAft>
+              <a:buSzPts val="1100"/>
+              <a:buChar char="-"/>
+            </a:pPr>
+            <a:r>
+              <a:rPr lang="en"/>
+              <a:t>The most common umbrella type of allegation was abuse of authority</a:t>
+            </a:r>
+            <a:endParaRPr/>
+          </a:p>
+          <a:p>
+            <a:pPr indent="-298450" lvl="0" marL="457200" rtl="0" algn="l">
+              <a:spcBef>
+                <a:spcPts val="0"/>
+              </a:spcBef>
+              <a:spcAft>
+                <a:spcPts val="0"/>
+              </a:spcAft>
+              <a:buSzPts val="1100"/>
+              <a:buChar char="-"/>
+            </a:pPr>
+            <a:r>
+              <a:rPr lang="en"/>
+              <a:t>Since 75 had highest numbers of allegations against them spanning from 1994-2020, were they being held accountable? What was going on? TRANSITION TO CHRISTIAN</a:t>
             </a:r>
             <a:endParaRPr/>
           </a:p>
@@ -1003,7 +1047,7 @@
   <p:cSld>
     <p:spTree>
       <p:nvGrpSpPr>
-        <p:cNvPr id="90" name="Shape 90"/>
+        <p:cNvPr id="91" name="Shape 91"/>
         <p:cNvGrpSpPr/>
         <p:nvPr/>
       </p:nvGrpSpPr>
@@ -1017,7 +1061,7 @@
       </p:grpSpPr>
       <p:sp>
         <p:nvSpPr>
-          <p:cNvPr id="91" name="Google Shape;91;g8d33ea1588_0_0:notes"/>
+          <p:cNvPr id="92" name="Google Shape;92;g8d33ea1588_0_0:notes"/>
           <p:cNvSpPr/>
           <p:nvPr>
             <p:ph idx="2" type="sldImg"/>
@@ -1052,7 +1096,7 @@
       </p:sp>
       <p:sp>
         <p:nvSpPr>
-          <p:cNvPr id="92" name="Google Shape;92;g8d33ea1588_0_0:notes"/>
+          <p:cNvPr id="93" name="Google Shape;93;g8d33ea1588_0_0:notes"/>
           <p:cNvSpPr txBox="1"/>
           <p:nvPr>
             <p:ph idx="1" type="body"/>
@@ -6165,7 +6209,7 @@
                                     </p:set>
                                     <p:anim calcmode="lin" valueType="num">
                                       <p:cBhvr additive="base">
-                                        <p:cTn dur="2100"/>
+                                        <p:cTn dur="1000"/>
                                         <p:tgtEl>
                                           <p:spTgt spid="55"/>
                                         </p:tgtEl>
@@ -6188,7 +6232,7 @@
                                     </p:anim>
                                     <p:anim calcmode="lin" valueType="num">
                                       <p:cBhvr additive="base">
-                                        <p:cTn dur="2100"/>
+                                        <p:cTn dur="1000"/>
                                         <p:tgtEl>
                                           <p:spTgt spid="55"/>
                                         </p:tgtEl>
@@ -6916,6 +6960,56 @@
           </p:txBody>
         </p:sp>
       </p:grpSp>
+      <p:sp>
+        <p:nvSpPr>
+          <p:cNvPr id="77" name="Google Shape;77;p14"/>
+          <p:cNvSpPr txBox="1"/>
+          <p:nvPr/>
+        </p:nvSpPr>
+        <p:spPr>
+          <a:xfrm>
+            <a:off x="3479175" y="39800"/>
+            <a:ext cx="2528100" cy="301200"/>
+          </a:xfrm>
+          <a:prstGeom prst="rect">
+            <a:avLst/>
+          </a:prstGeom>
+          <a:noFill/>
+          <a:ln>
+            <a:noFill/>
+          </a:ln>
+        </p:spPr>
+        <p:txBody>
+          <a:bodyPr anchorCtr="0" anchor="t" bIns="91425" lIns="91425" spcFirstLastPara="1" rIns="91425" wrap="square" tIns="91425">
+            <a:noAutofit/>
+          </a:bodyPr>
+          <a:lstStyle/>
+          <a:p>
+            <a:pPr indent="0" lvl="0" marL="0" rtl="0" algn="l">
+              <a:spcBef>
+                <a:spcPts val="0"/>
+              </a:spcBef>
+              <a:spcAft>
+                <a:spcPts val="0"/>
+              </a:spcAft>
+              <a:buNone/>
+            </a:pPr>
+            <a:r>
+              <a:rPr lang="en">
+                <a:solidFill>
+                  <a:srgbClr val="073D9C"/>
+                </a:solidFill>
+              </a:rPr>
+              <a:t>Total Allegations by Precinct</a:t>
+            </a:r>
+            <a:endParaRPr>
+              <a:solidFill>
+                <a:srgbClr val="073D9C"/>
+              </a:solidFill>
+            </a:endParaRPr>
+          </a:p>
+        </p:txBody>
+      </p:sp>
     </p:spTree>
   </p:cSld>
   <p:clrMapOvr>
@@ -6942,6 +7036,59 @@
                             </p:stCondLst>
                             <p:childTnLst>
                               <p:par>
+                                <p:cTn fill="hold" nodeType="clickEffect" presetClass="entr" presetID="10" presetSubtype="0">
+                                  <p:stCondLst>
+                                    <p:cond delay="0"/>
+                                  </p:stCondLst>
+                                  <p:childTnLst>
+                                    <p:set>
+                                      <p:cBhvr>
+                                        <p:cTn dur="1" fill="hold">
+                                          <p:stCondLst>
+                                            <p:cond delay="0"/>
+                                          </p:stCondLst>
+                                        </p:cTn>
+                                        <p:tgtEl>
+                                          <p:spTgt spid="65"/>
+                                        </p:tgtEl>
+                                        <p:attrNameLst>
+                                          <p:attrName>style.visibility</p:attrName>
+                                        </p:attrNameLst>
+                                      </p:cBhvr>
+                                      <p:to>
+                                        <p:strVal val="visible"/>
+                                      </p:to>
+                                    </p:set>
+                                    <p:animEffect filter="fade" transition="in">
+                                      <p:cBhvr>
+                                        <p:cTn dur="1000"/>
+                                        <p:tgtEl>
+                                          <p:spTgt spid="65"/>
+                                        </p:tgtEl>
+                                      </p:cBhvr>
+                                    </p:animEffect>
+                                  </p:childTnLst>
+                                </p:cTn>
+                              </p:par>
+                            </p:childTnLst>
+                          </p:cTn>
+                        </p:par>
+                      </p:childTnLst>
+                    </p:cTn>
+                  </p:par>
+                  <p:par>
+                    <p:cTn fill="hold">
+                      <p:stCondLst>
+                        <p:cond delay="indefinite"/>
+                      </p:stCondLst>
+                      <p:childTnLst>
+                        <p:par>
+                          <p:cTn fill="hold">
+                            <p:stCondLst>
+                              <p:cond delay="0"/>
+                            </p:stCondLst>
+                            <p:childTnLst>
+                              <p:par>
                                 <p:cTn fill="hold" nodeType="clickEffect" presetClass="exit" presetID="10" presetSubtype="0">
                                   <p:stCondLst>
                                     <p:cond delay="0"/>
@@ -6949,7 +7096,7 @@
                                   <p:childTnLst>
                                     <p:animEffect filter="fade" transition="out">
                                       <p:cBhvr>
-                                        <p:cTn dur="2600"/>
+                                        <p:cTn dur="5000"/>
                                         <p:tgtEl>
                                           <p:spTgt spid="66"/>
                                         </p:tgtEl>
@@ -6959,7 +7106,7 @@
                                       <p:cBhvr>
                                         <p:cTn dur="1" fill="hold">
                                           <p:stCondLst>
-                                            <p:cond delay="2600"/>
+                                            <p:cond delay="5000"/>
                                           </p:stCondLst>
                                         </p:cTn>
                                         <p:tgtEl>
@@ -7211,59 +7358,6 @@
                       </p:childTnLst>
                     </p:cTn>
                   </p:par>
-                  <p:par>
-                    <p:cTn fill="hold">
-                      <p:stCondLst>
-                        <p:cond delay="indefinite"/>
-                      </p:stCondLst>
-                      <p:childTnLst>
-                        <p:par>
-                          <p:cTn fill="hold">
-                            <p:stCondLst>
-                              <p:cond delay="0"/>
-                            </p:stCondLst>
-                            <p:childTnLst>
-                              <p:par>
-                                <p:cTn fill="hold" nodeType="clickEffect" presetClass="entr" presetID="10" presetSubtype="0">
-                                  <p:stCondLst>
-                                    <p:cond delay="0"/>
-                                  </p:stCondLst>
-                                  <p:childTnLst>
-                                    <p:set>
-                                      <p:cBhvr>
-                                        <p:cTn dur="1" fill="hold">
-                                          <p:stCondLst>
-                                            <p:cond delay="0"/>
-                                          </p:stCondLst>
-                                        </p:cTn>
-                                        <p:tgtEl>
-                                          <p:spTgt spid="66"/>
-                                        </p:tgtEl>
-                                        <p:attrNameLst>
-                                          <p:attrName>style.visibility</p:attrName>
-                                        </p:attrNameLst>
-                                      </p:cBhvr>
-                                      <p:to>
-                                        <p:strVal val="visible"/>
-                                      </p:to>
-                                    </p:set>
-                                    <p:animEffect filter="fade" transition="in">
-                                      <p:cBhvr>
-                                        <p:cTn dur="1000"/>
-                                        <p:tgtEl>
-                                          <p:spTgt spid="66"/>
-                                        </p:tgtEl>
-                                      </p:cBhvr>
-                                    </p:animEffect>
-                                  </p:childTnLst>
-                                </p:cTn>
-                              </p:par>
-                            </p:childTnLst>
-                          </p:cTn>
-                        </p:par>
-                      </p:childTnLst>
-                    </p:cTn>
-                  </p:par>
                 </p:childTnLst>
               </p:cTn>
               <p:prevCondLst>
@@ -7294,7 +7388,7 @@
   <p:cSld>
     <p:spTree>
       <p:nvGrpSpPr>
-        <p:cNvPr id="80" name="Shape 80"/>
+        <p:cNvPr id="81" name="Shape 81"/>
         <p:cNvGrpSpPr/>
         <p:nvPr/>
       </p:nvGrpSpPr>
@@ -7308,7 +7402,7 @@
       </p:grpSpPr>
       <p:grpSp>
         <p:nvGrpSpPr>
-          <p:cNvPr id="81" name="Google Shape;81;p15"/>
+          <p:cNvPr id="82" name="Google Shape;82;p15"/>
           <p:cNvGrpSpPr/>
           <p:nvPr/>
         </p:nvGrpSpPr>
@@ -7322,7 +7416,7 @@
         </p:grpSpPr>
         <p:pic>
           <p:nvPicPr>
-            <p:cNvPr id="82" name="Google Shape;82;p15"/>
+            <p:cNvPr id="83" name="Google Shape;83;p15"/>
             <p:cNvPicPr preferRelativeResize="0"/>
             <p:nvPr/>
           </p:nvPicPr>
@@ -7349,7 +7443,7 @@
         </p:pic>
         <p:pic>
           <p:nvPicPr>
-            <p:cNvPr id="83" name="Google Shape;83;p15"/>
+            <p:cNvPr id="84" name="Google Shape;84;p15"/>
             <p:cNvPicPr preferRelativeResize="0"/>
             <p:nvPr/>
           </p:nvPicPr>
@@ -7384,7 +7478,7 @@
         </p:pic>
         <p:pic>
           <p:nvPicPr>
-            <p:cNvPr id="84" name="Google Shape;84;p15"/>
+            <p:cNvPr id="85" name="Google Shape;85;p15"/>
             <p:cNvPicPr preferRelativeResize="0"/>
             <p:nvPr/>
           </p:nvPicPr>
@@ -7419,7 +7513,7 @@
         </p:pic>
         <p:pic>
           <p:nvPicPr>
-            <p:cNvPr id="85" name="Google Shape;85;p15"/>
+            <p:cNvPr id="86" name="Google Shape;86;p15"/>
             <p:cNvPicPr preferRelativeResize="0"/>
             <p:nvPr/>
           </p:nvPicPr>
@@ -7454,7 +7548,7 @@
         </p:pic>
         <p:pic>
           <p:nvPicPr>
-            <p:cNvPr id="86" name="Google Shape;86;p15"/>
+            <p:cNvPr id="87" name="Google Shape;87;p15"/>
             <p:cNvPicPr preferRelativeResize="0"/>
             <p:nvPr/>
           </p:nvPicPr>
@@ -7489,7 +7583,7 @@
         </p:pic>
         <p:sp>
           <p:nvSpPr>
-            <p:cNvPr id="87" name="Google Shape;87;p15"/>
+            <p:cNvPr id="88" name="Google Shape;88;p15"/>
             <p:cNvSpPr txBox="1"/>
             <p:nvPr/>
           </p:nvSpPr>
@@ -7532,7 +7626,7 @@
       </p:grpSp>
       <p:sp>
         <p:nvSpPr>
-          <p:cNvPr id="88" name="Google Shape;88;p15"/>
+          <p:cNvPr id="89" name="Google Shape;89;p15"/>
           <p:cNvSpPr txBox="1"/>
           <p:nvPr/>
         </p:nvSpPr>
@@ -7623,7 +7717,7 @@
       </p:sp>
       <p:sp>
         <p:nvSpPr>
-          <p:cNvPr id="89" name="Google Shape;89;p15"/>
+          <p:cNvPr id="90" name="Google Shape;90;p15"/>
           <p:cNvSpPr txBox="1"/>
           <p:nvPr/>
         </p:nvSpPr>
@@ -7732,7 +7826,7 @@
   <p:cSld>
     <p:spTree>
       <p:nvGrpSpPr>
-        <p:cNvPr id="93" name="Shape 93"/>
+        <p:cNvPr id="94" name="Shape 94"/>
         <p:cNvGrpSpPr/>
         <p:nvPr/>
       </p:nvGrpSpPr>
@@ -7746,7 +7840,7 @@
       </p:grpSpPr>
       <p:pic>
         <p:nvPicPr>
-          <p:cNvPr id="94" name="Google Shape;94;p16"/>
+          <p:cNvPr id="95" name="Google Shape;95;p16"/>
           <p:cNvPicPr preferRelativeResize="0"/>
           <p:nvPr/>
         </p:nvPicPr>
@@ -7774,7 +7868,7 @@
       </p:pic>
       <p:sp>
         <p:nvSpPr>
-          <p:cNvPr id="95" name="Google Shape;95;p16"/>
+          <p:cNvPr id="96" name="Google Shape;96;p16"/>
           <p:cNvSpPr txBox="1"/>
           <p:nvPr/>
         </p:nvSpPr>
@@ -7871,7 +7965,7 @@
       </p:sp>
       <p:pic>
         <p:nvPicPr>
-          <p:cNvPr id="96" name="Google Shape;96;p16"/>
+          <p:cNvPr id="97" name="Google Shape;97;p16"/>
           <p:cNvPicPr preferRelativeResize="0"/>
           <p:nvPr/>
         </p:nvPicPr>
@@ -7906,6 +8000,285 @@
 </file>
 
 <file path=ppt/theme/theme1.xml><?xml version="1.0" encoding="utf-8"?>
+<a:theme xmlns:a="http://schemas.openxmlformats.org/drawingml/2006/main" xmlns:r="http://schemas.openxmlformats.org/officeDocument/2006/relationships" name="Simple Light">
+  <a:themeElements>
+    <a:clrScheme name="Simple Light">
+      <a:dk1>
+        <a:srgbClr val="000000"/>
+      </a:dk1>
+      <a:lt1>
+        <a:srgbClr val="FFFFFF"/>
+      </a:lt1>
+      <a:dk2>
+        <a:srgbClr val="595959"/>
+      </a:dk2>
+      <a:lt2>
+        <a:srgbClr val="EEEEEE"/>
+      </a:lt2>
+      <a:accent1>
+        <a:srgbClr val="FFAB40"/>
+      </a:accent1>
+      <a:accent2>
+        <a:srgbClr val="212121"/>
+      </a:accent2>
+      <a:accent3>
+        <a:srgbClr val="78909C"/>
+      </a:accent3>
+      <a:accent4>
+        <a:srgbClr val="FFAB40"/>
+      </a:accent4>
+      <a:accent5>
+        <a:srgbClr val="0097A7"/>
+      </a:accent5>
+      <a:accent6>
+        <a:srgbClr val="EEFF41"/>
+      </a:accent6>
+      <a:hlink>
+        <a:srgbClr val="0097A7"/>
+      </a:hlink>
+      <a:folHlink>
+        <a:srgbClr val="0097A7"/>
+      </a:folHlink>
+    </a:clrScheme>
+    <a:fontScheme name="Office">
+      <a:majorFont>
+        <a:latin typeface="Arial"/>
+        <a:ea typeface=""/>
+        <a:cs typeface=""/>
+        <a:font script="Jpan" typeface="ＭＳ Ｐゴシック"/>
+        <a:font script="Hang" typeface="맑은 고딕"/>
+        <a:font script="Hans" typeface="宋体"/>
+        <a:font script="Hant" typeface="新細明體"/>
+        <a:font script="Arab" typeface="Times New Roman"/>
+        <a:font script="Hebr" typeface="Times New Roman"/>
+        <a:font script="Thai" typeface="Angsana New"/>
+        <a:font script="Ethi" typeface="Nyala"/>
+        <a:font script="Beng" typeface="Vrinda"/>
+        <a:font script="Gujr" typeface="Shruti"/>
+        <a:font script="Khmr" typeface="MoolBoran"/>
+        <a:font script="Knda" typeface="Tunga"/>
+        <a:font script="Guru" typeface="Raavi"/>
+        <a:font script="Cans" typeface="Euphemia"/>
+        <a:font script="Cher" typeface="Plantagenet Cherokee"/>
+        <a:font script="Yiii" typeface="Microsoft Yi Baiti"/>
+        <a:font script="Tibt" typeface="Microsoft Himalaya"/>
+        <a:font script="Thaa" typeface="MV Boli"/>
+        <a:font script="Deva" typeface="Mangal"/>
+        <a:font script="Telu" typeface="Gautami"/>
+        <a:font script="Taml" typeface="Latha"/>
+        <a:font script="Syrc" typeface="Estrangelo Edessa"/>
+        <a:font script="Orya" typeface="Kalinga"/>
+        <a:font script="Mlym" typeface="Kartika"/>
+        <a:font script="Laoo" typeface="DokChampa"/>
+        <a:font script="Sinh" typeface="Iskoola Pota"/>
+        <a:font script="Mong" typeface="Mongolian Baiti"/>
+        <a:font script="Viet" typeface="Times New Roman"/>
+        <a:font script="Uigh" typeface="Microsoft Uighur"/>
+        <a:font script="Geor" typeface="Sylfaen"/>
+      </a:majorFont>
+      <a:minorFont>
+        <a:latin typeface="Arial"/>
+        <a:ea typeface=""/>
+        <a:cs typeface=""/>
+        <a:font script="Jpan" typeface="ＭＳ Ｐゴシック"/>
+        <a:font script="Hang" typeface="맑은 고딕"/>
+        <a:font script="Hans" typeface="宋体"/>
+        <a:font script="Hant" typeface="新細明體"/>
+        <a:font script="Arab" typeface="Arial"/>
+        <a:font script="Hebr" typeface="Arial"/>
+        <a:font script="Thai" typeface="Cordia New"/>
+        <a:font script="Ethi" typeface="Nyala"/>
+        <a:font script="Beng" typeface="Vrinda"/>
+        <a:font script="Gujr" typeface="Shruti"/>
+        <a:font script="Khmr" typeface="DaunPenh"/>
+        <a:font script="Knda" typeface="Tunga"/>
+        <a:font script="Guru" typeface="Raavi"/>
+        <a:font script="Cans" typeface="Euphemia"/>
+        <a:font script="Cher" typeface="Plantagenet Cherokee"/>
+        <a:font script="Yiii" typeface="Microsoft Yi Baiti"/>
+        <a:font script="Tibt" typeface="Microsoft Himalaya"/>
+        <a:font script="Thaa" typeface="MV Boli"/>
+        <a:font script="Deva" typeface="Mangal"/>
+        <a:font script="Telu" typeface="Gautami"/>
+        <a:font script="Taml" typeface="Latha"/>
+        <a:font script="Syrc" typeface="Estrangelo Edessa"/>
+        <a:font script="Orya" typeface="Kalinga"/>
+        <a:font script="Mlym" typeface="Kartika"/>
+        <a:font script="Laoo" typeface="DokChampa"/>
+        <a:font script="Sinh" typeface="Iskoola Pota"/>
+        <a:font script="Mong" typeface="Mongolian Baiti"/>
+        <a:font script="Viet" typeface="Arial"/>
+        <a:font script="Uigh" typeface="Microsoft Uighur"/>
+        <a:font script="Geor" typeface="Sylfaen"/>
+      </a:minorFont>
+    </a:fontScheme>
+    <a:fmtScheme name="Office">
+      <a:fillStyleLst>
+        <a:solidFill>
+          <a:schemeClr val="phClr"/>
+        </a:solidFill>
+        <a:gradFill rotWithShape="1">
+          <a:gsLst>
+            <a:gs pos="0">
+              <a:schemeClr val="phClr">
+                <a:tint val="50000"/>
+                <a:satMod val="300000"/>
+              </a:schemeClr>
+            </a:gs>
+            <a:gs pos="35000">
+              <a:schemeClr val="phClr">
+                <a:tint val="37000"/>
+                <a:satMod val="300000"/>
+              </a:schemeClr>
+            </a:gs>
+            <a:gs pos="100000">
+              <a:schemeClr val="phClr">
+                <a:tint val="15000"/>
+                <a:satMod val="350000"/>
+              </a:schemeClr>
+            </a:gs>
+          </a:gsLst>
+          <a:lin ang="16200000" scaled="1"/>
+        </a:gradFill>
+        <a:gradFill rotWithShape="1">
+          <a:gsLst>
+            <a:gs pos="0">
+              <a:schemeClr val="phClr">
+                <a:tint val="100000"/>
+                <a:shade val="100000"/>
+                <a:satMod val="130000"/>
+              </a:schemeClr>
+            </a:gs>
+            <a:gs pos="100000">
+              <a:schemeClr val="phClr">
+                <a:tint val="50000"/>
+                <a:shade val="100000"/>
+                <a:satMod val="350000"/>
+              </a:schemeClr>
+            </a:gs>
+          </a:gsLst>
+          <a:lin ang="16200000" scaled="0"/>
+        </a:gradFill>
+      </a:fillStyleLst>
+      <a:lnStyleLst>
+        <a:ln w="9525" cap="flat" cmpd="sng" algn="ctr">
+          <a:solidFill>
+            <a:schemeClr val="phClr">
+              <a:shade val="95000"/>
+              <a:satMod val="105000"/>
+            </a:schemeClr>
+          </a:solidFill>
+          <a:prstDash val="solid"/>
+        </a:ln>
+        <a:ln w="25400" cap="flat" cmpd="sng" algn="ctr">
+          <a:solidFill>
+            <a:schemeClr val="phClr"/>
+          </a:solidFill>
+          <a:prstDash val="solid"/>
+        </a:ln>
+        <a:ln w="38100" cap="flat" cmpd="sng" algn="ctr">
+          <a:solidFill>
+            <a:schemeClr val="phClr"/>
+          </a:solidFill>
+          <a:prstDash val="solid"/>
+        </a:ln>
+      </a:lnStyleLst>
+      <a:effectStyleLst>
+        <a:effectStyle>
+          <a:effectLst>
+            <a:outerShdw blurRad="40000" dist="20000" dir="5400000" rotWithShape="0">
+              <a:srgbClr val="000000">
+                <a:alpha val="38000"/>
+              </a:srgbClr>
+            </a:outerShdw>
+          </a:effectLst>
+        </a:effectStyle>
+        <a:effectStyle>
+          <a:effectLst>
+            <a:outerShdw blurRad="40000" dist="23000" dir="5400000" rotWithShape="0">
+              <a:srgbClr val="000000">
+                <a:alpha val="35000"/>
+              </a:srgbClr>
+            </a:outerShdw>
+          </a:effectLst>
+        </a:effectStyle>
+        <a:effectStyle>
+          <a:effectLst>
+            <a:outerShdw blurRad="40000" dist="23000" dir="5400000" rotWithShape="0">
+              <a:srgbClr val="000000">
+                <a:alpha val="35000"/>
+              </a:srgbClr>
+            </a:outerShdw>
+          </a:effectLst>
+          <a:scene3d>
+            <a:camera prst="orthographicFront">
+              <a:rot lat="0" lon="0" rev="0"/>
+            </a:camera>
+            <a:lightRig rig="threePt" dir="t">
+              <a:rot lat="0" lon="0" rev="1200000"/>
+            </a:lightRig>
+          </a:scene3d>
+          <a:sp3d>
+            <a:bevelT w="63500" h="25400"/>
+          </a:sp3d>
+        </a:effectStyle>
+      </a:effectStyleLst>
+      <a:bgFillStyleLst>
+        <a:solidFill>
+          <a:schemeClr val="phClr"/>
+        </a:solidFill>
+        <a:gradFill rotWithShape="1">
+          <a:gsLst>
+            <a:gs pos="0">
+              <a:schemeClr val="phClr">
+                <a:tint val="40000"/>
+                <a:satMod val="350000"/>
+              </a:schemeClr>
+            </a:gs>
+            <a:gs pos="40000">
+              <a:schemeClr val="phClr">
+                <a:tint val="45000"/>
+                <a:shade val="99000"/>
+                <a:satMod val="350000"/>
+              </a:schemeClr>
+            </a:gs>
+            <a:gs pos="100000">
+              <a:schemeClr val="phClr">
+                <a:shade val="20000"/>
+                <a:satMod val="255000"/>
+              </a:schemeClr>
+            </a:gs>
+          </a:gsLst>
+          <a:path path="circle">
+            <a:fillToRect l="50000" t="-80000" r="50000" b="180000"/>
+          </a:path>
+        </a:gradFill>
+        <a:gradFill rotWithShape="1">
+          <a:gsLst>
+            <a:gs pos="0">
+              <a:schemeClr val="phClr">
+                <a:tint val="80000"/>
+                <a:satMod val="300000"/>
+              </a:schemeClr>
+            </a:gs>
+            <a:gs pos="100000">
+              <a:schemeClr val="phClr">
+                <a:shade val="30000"/>
+                <a:satMod val="200000"/>
+              </a:schemeClr>
+            </a:gs>
+          </a:gsLst>
+          <a:path path="circle">
+            <a:fillToRect l="50000" t="50000" r="50000" b="50000"/>
+          </a:path>
+        </a:gradFill>
+      </a:bgFillStyleLst>
+    </a:fmtScheme>
+  </a:themeElements>
+</a:theme>
+</file>
+
+<file path=ppt/theme/theme2.xml><?xml version="1.0" encoding="utf-8"?>
 <a:theme xmlns:a="http://schemas.openxmlformats.org/drawingml/2006/main" xmlns:r="http://schemas.openxmlformats.org/officeDocument/2006/relationships">
   <a:themeElements>
     <a:clrScheme name="Default">
@@ -8182,283 +8555,4 @@
     </a:fmtScheme>
   </a:themeElements>
 </a:theme>
-</file>
-
-<file path=ppt/theme/theme2.xml><?xml version="1.0" encoding="utf-8"?>
-<a:theme xmlns:a="http://schemas.openxmlformats.org/drawingml/2006/main" xmlns:r="http://schemas.openxmlformats.org/officeDocument/2006/relationships" name="Simple Light">
-  <a:themeElements>
-    <a:clrScheme name="Simple Light">
-      <a:dk1>
-        <a:srgbClr val="000000"/>
-      </a:dk1>
-      <a:lt1>
-        <a:srgbClr val="FFFFFF"/>
-      </a:lt1>
-      <a:dk2>
-        <a:srgbClr val="595959"/>
-      </a:dk2>
-      <a:lt2>
-        <a:srgbClr val="EEEEEE"/>
-      </a:lt2>
-      <a:accent1>
-        <a:srgbClr val="FFAB40"/>
-      </a:accent1>
-      <a:accent2>
-        <a:srgbClr val="212121"/>
-      </a:accent2>
-      <a:accent3>
-        <a:srgbClr val="78909C"/>
-      </a:accent3>
-      <a:accent4>
-        <a:srgbClr val="FFAB40"/>
-      </a:accent4>
-      <a:accent5>
-        <a:srgbClr val="0097A7"/>
-      </a:accent5>
-      <a:accent6>
-        <a:srgbClr val="EEFF41"/>
-      </a:accent6>
-      <a:hlink>
-        <a:srgbClr val="0097A7"/>
-      </a:hlink>
-      <a:folHlink>
-        <a:srgbClr val="0097A7"/>
-      </a:folHlink>
-    </a:clrScheme>
-    <a:fontScheme name="Office">
-      <a:majorFont>
-        <a:latin typeface="Arial"/>
-        <a:ea typeface=""/>
-        <a:cs typeface=""/>
-        <a:font script="Jpan" typeface="ＭＳ Ｐゴシック"/>
-        <a:font script="Hang" typeface="맑은 고딕"/>
-        <a:font script="Hans" typeface="宋体"/>
-        <a:font script="Hant" typeface="新細明體"/>
-        <a:font script="Arab" typeface="Times New Roman"/>
-        <a:font script="Hebr" typeface="Times New Roman"/>
-        <a:font script="Thai" typeface="Angsana New"/>
-        <a:font script="Ethi" typeface="Nyala"/>
-        <a:font script="Beng" typeface="Vrinda"/>
-        <a:font script="Gujr" typeface="Shruti"/>
-        <a:font script="Khmr" typeface="MoolBoran"/>
-        <a:font script="Knda" typeface="Tunga"/>
-        <a:font script="Guru" typeface="Raavi"/>
-        <a:font script="Cans" typeface="Euphemia"/>
-        <a:font script="Cher" typeface="Plantagenet Cherokee"/>
-        <a:font script="Yiii" typeface="Microsoft Yi Baiti"/>
-        <a:font script="Tibt" typeface="Microsoft Himalaya"/>
-        <a:font script="Thaa" typeface="MV Boli"/>
-        <a:font script="Deva" typeface="Mangal"/>
-        <a:font script="Telu" typeface="Gautami"/>
-        <a:font script="Taml" typeface="Latha"/>
-        <a:font script="Syrc" typeface="Estrangelo Edessa"/>
-        <a:font script="Orya" typeface="Kalinga"/>
-        <a:font script="Mlym" typeface="Kartika"/>
-        <a:font script="Laoo" typeface="DokChampa"/>
-        <a:font script="Sinh" typeface="Iskoola Pota"/>
-        <a:font script="Mong" typeface="Mongolian Baiti"/>
-        <a:font script="Viet" typeface="Times New Roman"/>
-        <a:font script="Uigh" typeface="Microsoft Uighur"/>
-        <a:font script="Geor" typeface="Sylfaen"/>
-      </a:majorFont>
-      <a:minorFont>
-        <a:latin typeface="Arial"/>
-        <a:ea typeface=""/>
-        <a:cs typeface=""/>
-        <a:font script="Jpan" typeface="ＭＳ Ｐゴシック"/>
-        <a:font script="Hang" typeface="맑은 고딕"/>
-        <a:font script="Hans" typeface="宋体"/>
-        <a:font script="Hant" typeface="新細明體"/>
-        <a:font script="Arab" typeface="Arial"/>
-        <a:font script="Hebr" typeface="Arial"/>
-        <a:font script="Thai" typeface="Cordia New"/>
-        <a:font script="Ethi" typeface="Nyala"/>
-        <a:font script="Beng" typeface="Vrinda"/>
-        <a:font script="Gujr" typeface="Shruti"/>
-        <a:font script="Khmr" typeface="DaunPenh"/>
-        <a:font script="Knda" typeface="Tunga"/>
-        <a:font script="Guru" typeface="Raavi"/>
-        <a:font script="Cans" typeface="Euphemia"/>
-        <a:font script="Cher" typeface="Plantagenet Cherokee"/>
-        <a:font script="Yiii" typeface="Microsoft Yi Baiti"/>
-        <a:font script="Tibt" typeface="Microsoft Himalaya"/>
-        <a:font script="Thaa" typeface="MV Boli"/>
-        <a:font script="Deva" typeface="Mangal"/>
-        <a:font script="Telu" typeface="Gautami"/>
-        <a:font script="Taml" typeface="Latha"/>
-        <a:font script="Syrc" typeface="Estrangelo Edessa"/>
-        <a:font script="Orya" typeface="Kalinga"/>
-        <a:font script="Mlym" typeface="Kartika"/>
-        <a:font script="Laoo" typeface="DokChampa"/>
-        <a:font script="Sinh" typeface="Iskoola Pota"/>
-        <a:font script="Mong" typeface="Mongolian Baiti"/>
-        <a:font script="Viet" typeface="Arial"/>
-        <a:font script="Uigh" typeface="Microsoft Uighur"/>
-        <a:font script="Geor" typeface="Sylfaen"/>
-      </a:minorFont>
-    </a:fontScheme>
-    <a:fmtScheme name="Office">
-      <a:fillStyleLst>
-        <a:solidFill>
-          <a:schemeClr val="phClr"/>
-        </a:solidFill>
-        <a:gradFill rotWithShape="1">
-          <a:gsLst>
-            <a:gs pos="0">
-              <a:schemeClr val="phClr">
-                <a:tint val="50000"/>
-                <a:satMod val="300000"/>
-              </a:schemeClr>
-            </a:gs>
-            <a:gs pos="35000">
-              <a:schemeClr val="phClr">
-                <a:tint val="37000"/>
-                <a:satMod val="300000"/>
-              </a:schemeClr>
-            </a:gs>
-            <a:gs pos="100000">
-              <a:schemeClr val="phClr">
-                <a:tint val="15000"/>
-                <a:satMod val="350000"/>
-              </a:schemeClr>
-            </a:gs>
-          </a:gsLst>
-          <a:lin ang="16200000" scaled="1"/>
-        </a:gradFill>
-        <a:gradFill rotWithShape="1">
-          <a:gsLst>
-            <a:gs pos="0">
-              <a:schemeClr val="phClr">
-                <a:tint val="100000"/>
-                <a:shade val="100000"/>
-                <a:satMod val="130000"/>
-              </a:schemeClr>
-            </a:gs>
-            <a:gs pos="100000">
-              <a:schemeClr val="phClr">
-                <a:tint val="50000"/>
-                <a:shade val="100000"/>
-                <a:satMod val="350000"/>
-              </a:schemeClr>
-            </a:gs>
-          </a:gsLst>
-          <a:lin ang="16200000" scaled="0"/>
-        </a:gradFill>
-      </a:fillStyleLst>
-      <a:lnStyleLst>
-        <a:ln w="9525" cap="flat" cmpd="sng" algn="ctr">
-          <a:solidFill>
-            <a:schemeClr val="phClr">
-              <a:shade val="95000"/>
-              <a:satMod val="105000"/>
-            </a:schemeClr>
-          </a:solidFill>
-          <a:prstDash val="solid"/>
-        </a:ln>
-        <a:ln w="25400" cap="flat" cmpd="sng" algn="ctr">
-          <a:solidFill>
-            <a:schemeClr val="phClr"/>
-          </a:solidFill>
-          <a:prstDash val="solid"/>
-        </a:ln>
-        <a:ln w="38100" cap="flat" cmpd="sng" algn="ctr">
-          <a:solidFill>
-            <a:schemeClr val="phClr"/>
-          </a:solidFill>
-          <a:prstDash val="solid"/>
-        </a:ln>
-      </a:lnStyleLst>
-      <a:effectStyleLst>
-        <a:effectStyle>
-          <a:effectLst>
-            <a:outerShdw blurRad="40000" dist="20000" dir="5400000" rotWithShape="0">
-              <a:srgbClr val="000000">
-                <a:alpha val="38000"/>
-              </a:srgbClr>
-            </a:outerShdw>
-          </a:effectLst>
-        </a:effectStyle>
-        <a:effectStyle>
-          <a:effectLst>
-            <a:outerShdw blurRad="40000" dist="23000" dir="5400000" rotWithShape="0">
-              <a:srgbClr val="000000">
-                <a:alpha val="35000"/>
-              </a:srgbClr>
-            </a:outerShdw>
-          </a:effectLst>
-        </a:effectStyle>
-        <a:effectStyle>
-          <a:effectLst>
-            <a:outerShdw blurRad="40000" dist="23000" dir="5400000" rotWithShape="0">
-              <a:srgbClr val="000000">
-                <a:alpha val="35000"/>
-              </a:srgbClr>
-            </a:outerShdw>
-          </a:effectLst>
-          <a:scene3d>
-            <a:camera prst="orthographicFront">
-              <a:rot lat="0" lon="0" rev="0"/>
-            </a:camera>
-            <a:lightRig rig="threePt" dir="t">
-              <a:rot lat="0" lon="0" rev="1200000"/>
-            </a:lightRig>
-          </a:scene3d>
-          <a:sp3d>
-            <a:bevelT w="63500" h="25400"/>
-          </a:sp3d>
-        </a:effectStyle>
-      </a:effectStyleLst>
-      <a:bgFillStyleLst>
-        <a:solidFill>
-          <a:schemeClr val="phClr"/>
-        </a:solidFill>
-        <a:gradFill rotWithShape="1">
-          <a:gsLst>
-            <a:gs pos="0">
-              <a:schemeClr val="phClr">
-                <a:tint val="40000"/>
-                <a:satMod val="350000"/>
-              </a:schemeClr>
-            </a:gs>
-            <a:gs pos="40000">
-              <a:schemeClr val="phClr">
-                <a:tint val="45000"/>
-                <a:shade val="99000"/>
-                <a:satMod val="350000"/>
-              </a:schemeClr>
-            </a:gs>
-            <a:gs pos="100000">
-              <a:schemeClr val="phClr">
-                <a:shade val="20000"/>
-                <a:satMod val="255000"/>
-              </a:schemeClr>
-            </a:gs>
-          </a:gsLst>
-          <a:path path="circle">
-            <a:fillToRect l="50000" t="-80000" r="50000" b="180000"/>
-          </a:path>
-        </a:gradFill>
-        <a:gradFill rotWithShape="1">
-          <a:gsLst>
-            <a:gs pos="0">
-              <a:schemeClr val="phClr">
-                <a:tint val="80000"/>
-                <a:satMod val="300000"/>
-              </a:schemeClr>
-            </a:gs>
-            <a:gs pos="100000">
-              <a:schemeClr val="phClr">
-                <a:shade val="30000"/>
-                <a:satMod val="200000"/>
-              </a:schemeClr>
-            </a:gs>
-          </a:gsLst>
-          <a:path path="circle">
-            <a:fillToRect l="50000" t="50000" r="50000" b="50000"/>
-          </a:path>
-        </a:gradFill>
-      </a:bgFillStyleLst>
-    </a:fmtScheme>
-  </a:themeElements>
-</a:theme>
 </file>
</xml_diff>